<commit_message>
write testcases if alert has invalid zip, invalid dates. Delete unused method
</commit_message>
<xml_diff>
--- a/presentation/presentation.pptx
+++ b/presentation/presentation.pptx
@@ -5,15 +5,17 @@
     <p:sldMasterId id="2147483684" r:id="rId1"/>
   </p:sldMasterIdLst>
   <p:notesMasterIdLst>
-    <p:notesMasterId r:id="rId8"/>
+    <p:notesMasterId r:id="rId10"/>
   </p:notesMasterIdLst>
   <p:sldIdLst>
     <p:sldId id="256" r:id="rId2"/>
     <p:sldId id="257" r:id="rId3"/>
-    <p:sldId id="262" r:id="rId4"/>
-    <p:sldId id="258" r:id="rId5"/>
-    <p:sldId id="259" r:id="rId6"/>
-    <p:sldId id="260" r:id="rId7"/>
+    <p:sldId id="263" r:id="rId4"/>
+    <p:sldId id="264" r:id="rId5"/>
+    <p:sldId id="262" r:id="rId6"/>
+    <p:sldId id="258" r:id="rId7"/>
+    <p:sldId id="259" r:id="rId8"/>
+    <p:sldId id="260" r:id="rId9"/>
   </p:sldIdLst>
   <p:sldSz cx="9144000" cy="6858000" type="screen4x3"/>
   <p:notesSz cx="6858000" cy="9144000"/>
@@ -202,7 +204,7 @@
           <a:p>
             <a:fld id="{90BAAEFC-A0F9-F94D-BF75-D39A92055781}" type="datetimeFigureOut">
               <a:rPr lang="de-DE" smtClean="0"/>
-              <a:t>10.12.16</a:t>
+              <a:t>12.12.2016</a:t>
             </a:fld>
             <a:endParaRPr lang="de-DE"/>
           </a:p>
@@ -266,38 +268,37 @@
           <a:p>
             <a:pPr lvl="0"/>
             <a:r>
-              <a:rPr lang="de-DE" smtClean="0"/>
+              <a:rPr lang="de-DE"/>
               <a:t>Mastertextformat bearbeiten</a:t>
             </a:r>
           </a:p>
           <a:p>
             <a:pPr lvl="1"/>
             <a:r>
-              <a:rPr lang="de-DE" smtClean="0"/>
+              <a:rPr lang="de-DE"/>
               <a:t>Zweite Ebene</a:t>
             </a:r>
           </a:p>
           <a:p>
             <a:pPr lvl="2"/>
             <a:r>
-              <a:rPr lang="de-DE" smtClean="0"/>
+              <a:rPr lang="de-DE"/>
               <a:t>Dritte Ebene</a:t>
             </a:r>
           </a:p>
           <a:p>
             <a:pPr lvl="3"/>
             <a:r>
-              <a:rPr lang="de-DE" smtClean="0"/>
+              <a:rPr lang="de-DE"/>
               <a:t>Vierte Ebene</a:t>
             </a:r>
           </a:p>
           <a:p>
             <a:pPr lvl="4"/>
             <a:r>
-              <a:rPr lang="de-DE" smtClean="0"/>
+              <a:rPr lang="de-DE"/>
               <a:t>Fünfte Ebene</a:t>
             </a:r>
-            <a:endParaRPr lang="de-DE"/>
           </a:p>
         </p:txBody>
       </p:sp>
@@ -361,7 +362,7 @@
           <a:p>
             <a:fld id="{13950C2F-95EC-6B4F-B04C-F863F5D70D4D}" type="slidenum">
               <a:rPr lang="de-DE" smtClean="0"/>
-              <a:t>‹Nr.›</a:t>
+              <a:t>‹#›</a:t>
             </a:fld>
             <a:endParaRPr lang="de-DE"/>
           </a:p>
@@ -703,7 +704,7 @@
           <a:p>
             <a:fld id="{13950C2F-95EC-6B4F-B04C-F863F5D70D4D}" type="slidenum">
               <a:rPr lang="de-DE" smtClean="0"/>
-              <a:t>4</a:t>
+              <a:t>6</a:t>
             </a:fld>
             <a:endParaRPr lang="de-DE"/>
           </a:p>
@@ -852,7 +853,7 @@
           </a:lstStyle>
           <a:p>
             <a:r>
-              <a:rPr lang="de-DE" smtClean="0"/>
+              <a:rPr lang="de-DE"/>
               <a:t>Mastertitelformat bearbeiten</a:t>
             </a:r>
             <a:endParaRPr lang="en-US" dirty="0"/>
@@ -924,7 +925,7 @@
           </a:lstStyle>
           <a:p>
             <a:r>
-              <a:rPr lang="de-DE" smtClean="0"/>
+              <a:rPr lang="de-DE"/>
               <a:t>Master-Untertitelformat bearbeiten</a:t>
             </a:r>
             <a:endParaRPr lang="en-US" dirty="0"/>
@@ -948,7 +949,7 @@
           <a:p>
             <a:fld id="{920B4DFB-6212-9B4E-B3A8-0607619CE807}" type="datetime1">
               <a:rPr lang="de-CH" smtClean="0"/>
-              <a:t>10.12.16</a:t>
+              <a:t>12.12.2016</a:t>
             </a:fld>
             <a:endParaRPr lang="de-DE"/>
           </a:p>
@@ -970,10 +971,9 @@
           <a:lstStyle/>
           <a:p>
             <a:r>
-              <a:rPr lang="de-DE" smtClean="0"/>
+              <a:rPr lang="de-DE"/>
               <a:t>Astrid Ytrehorn, Sabine Brunner, Lukas Würsch, Sarah Morillo, Markus Eggimann</a:t>
             </a:r>
-            <a:endParaRPr lang="de-DE"/>
           </a:p>
         </p:txBody>
       </p:sp>
@@ -994,7 +994,7 @@
           <a:p>
             <a:fld id="{A26CC7F3-58B4-F847-97F4-EBFB6E880BE1}" type="slidenum">
               <a:rPr lang="de-DE" smtClean="0"/>
-              <a:t>‹Nr.›</a:t>
+              <a:t>‹#›</a:t>
             </a:fld>
             <a:endParaRPr lang="de-DE"/>
           </a:p>
@@ -1079,7 +1079,7 @@
           <a:lstStyle/>
           <a:p>
             <a:r>
-              <a:rPr lang="de-DE" smtClean="0"/>
+              <a:rPr lang="de-DE"/>
               <a:t>Mastertitelformat bearbeiten</a:t>
             </a:r>
             <a:endParaRPr lang="en-US" dirty="0"/>
@@ -1103,35 +1103,35 @@
           <a:p>
             <a:pPr lvl="0"/>
             <a:r>
-              <a:rPr lang="de-DE" smtClean="0"/>
+              <a:rPr lang="de-DE"/>
               <a:t>Mastertextformat bearbeiten</a:t>
             </a:r>
           </a:p>
           <a:p>
             <a:pPr lvl="1"/>
             <a:r>
-              <a:rPr lang="de-DE" smtClean="0"/>
+              <a:rPr lang="de-DE"/>
               <a:t>Zweite Ebene</a:t>
             </a:r>
           </a:p>
           <a:p>
             <a:pPr lvl="2"/>
             <a:r>
-              <a:rPr lang="de-DE" smtClean="0"/>
+              <a:rPr lang="de-DE"/>
               <a:t>Dritte Ebene</a:t>
             </a:r>
           </a:p>
           <a:p>
             <a:pPr lvl="3"/>
             <a:r>
-              <a:rPr lang="de-DE" smtClean="0"/>
+              <a:rPr lang="de-DE"/>
               <a:t>Vierte Ebene</a:t>
             </a:r>
           </a:p>
           <a:p>
             <a:pPr lvl="4"/>
             <a:r>
-              <a:rPr lang="de-DE" smtClean="0"/>
+              <a:rPr lang="de-DE"/>
               <a:t>Fünfte Ebene</a:t>
             </a:r>
             <a:endParaRPr lang="en-US" dirty="0"/>
@@ -1155,7 +1155,7 @@
           <a:p>
             <a:fld id="{AE64A1D5-DBAA-3349-9ACF-47F8D40624F1}" type="datetime1">
               <a:rPr lang="de-CH" smtClean="0"/>
-              <a:t>10.12.16</a:t>
+              <a:t>12.12.2016</a:t>
             </a:fld>
             <a:endParaRPr lang="de-DE"/>
           </a:p>
@@ -1177,10 +1177,9 @@
           <a:lstStyle/>
           <a:p>
             <a:r>
-              <a:rPr lang="de-DE" smtClean="0"/>
+              <a:rPr lang="de-DE"/>
               <a:t>Astrid Ytrehorn, Sabine Brunner, Lukas Würsch, Sarah Morillo, Markus Eggimann</a:t>
             </a:r>
-            <a:endParaRPr lang="de-DE"/>
           </a:p>
         </p:txBody>
       </p:sp>
@@ -1201,7 +1200,7 @@
           <a:p>
             <a:fld id="{A26CC7F3-58B4-F847-97F4-EBFB6E880BE1}" type="slidenum">
               <a:rPr lang="de-DE" smtClean="0"/>
-              <a:t>‹Nr.›</a:t>
+              <a:t>‹#›</a:t>
             </a:fld>
             <a:endParaRPr lang="de-DE"/>
           </a:p>
@@ -1329,7 +1328,7 @@
           <a:lstStyle/>
           <a:p>
             <a:r>
-              <a:rPr lang="de-DE" smtClean="0"/>
+              <a:rPr lang="de-DE"/>
               <a:t>Mastertitelformat bearbeiten</a:t>
             </a:r>
             <a:endParaRPr lang="en-US" dirty="0"/>
@@ -1358,35 +1357,35 @@
           <a:p>
             <a:pPr lvl="0"/>
             <a:r>
-              <a:rPr lang="de-DE" smtClean="0"/>
+              <a:rPr lang="de-DE"/>
               <a:t>Mastertextformat bearbeiten</a:t>
             </a:r>
           </a:p>
           <a:p>
             <a:pPr lvl="1"/>
             <a:r>
-              <a:rPr lang="de-DE" smtClean="0"/>
+              <a:rPr lang="de-DE"/>
               <a:t>Zweite Ebene</a:t>
             </a:r>
           </a:p>
           <a:p>
             <a:pPr lvl="2"/>
             <a:r>
-              <a:rPr lang="de-DE" smtClean="0"/>
+              <a:rPr lang="de-DE"/>
               <a:t>Dritte Ebene</a:t>
             </a:r>
           </a:p>
           <a:p>
             <a:pPr lvl="3"/>
             <a:r>
-              <a:rPr lang="de-DE" smtClean="0"/>
+              <a:rPr lang="de-DE"/>
               <a:t>Vierte Ebene</a:t>
             </a:r>
           </a:p>
           <a:p>
             <a:pPr lvl="4"/>
             <a:r>
-              <a:rPr lang="de-DE" smtClean="0"/>
+              <a:rPr lang="de-DE"/>
               <a:t>Fünfte Ebene</a:t>
             </a:r>
             <a:endParaRPr lang="en-US" dirty="0"/>
@@ -1410,7 +1409,7 @@
           <a:p>
             <a:fld id="{ACA8F0ED-6B88-AF40-AC86-CEFC9C826F10}" type="datetime1">
               <a:rPr lang="de-CH" smtClean="0"/>
-              <a:t>10.12.16</a:t>
+              <a:t>12.12.2016</a:t>
             </a:fld>
             <a:endParaRPr lang="de-DE"/>
           </a:p>
@@ -1432,10 +1431,9 @@
           <a:lstStyle/>
           <a:p>
             <a:r>
-              <a:rPr lang="de-DE" smtClean="0"/>
+              <a:rPr lang="de-DE"/>
               <a:t>Astrid Ytrehorn, Sabine Brunner, Lukas Würsch, Sarah Morillo, Markus Eggimann</a:t>
             </a:r>
-            <a:endParaRPr lang="de-DE"/>
           </a:p>
         </p:txBody>
       </p:sp>
@@ -1456,7 +1454,7 @@
           <a:p>
             <a:fld id="{A26CC7F3-58B4-F847-97F4-EBFB6E880BE1}" type="slidenum">
               <a:rPr lang="de-DE" smtClean="0"/>
-              <a:t>‹Nr.›</a:t>
+              <a:t>‹#›</a:t>
             </a:fld>
             <a:endParaRPr lang="de-DE"/>
           </a:p>
@@ -1503,7 +1501,7 @@
           <a:lstStyle/>
           <a:p>
             <a:r>
-              <a:rPr lang="de-DE" smtClean="0"/>
+              <a:rPr lang="de-DE"/>
               <a:t>Mastertitelformat bearbeiten</a:t>
             </a:r>
             <a:endParaRPr lang="en-US" dirty="0"/>
@@ -1527,35 +1525,35 @@
           <a:p>
             <a:pPr lvl="0"/>
             <a:r>
-              <a:rPr lang="de-DE" smtClean="0"/>
+              <a:rPr lang="de-DE"/>
               <a:t>Mastertextformat bearbeiten</a:t>
             </a:r>
           </a:p>
           <a:p>
             <a:pPr lvl="1"/>
             <a:r>
-              <a:rPr lang="de-DE" smtClean="0"/>
+              <a:rPr lang="de-DE"/>
               <a:t>Zweite Ebene</a:t>
             </a:r>
           </a:p>
           <a:p>
             <a:pPr lvl="2"/>
             <a:r>
-              <a:rPr lang="de-DE" smtClean="0"/>
+              <a:rPr lang="de-DE"/>
               <a:t>Dritte Ebene</a:t>
             </a:r>
           </a:p>
           <a:p>
             <a:pPr lvl="3"/>
             <a:r>
-              <a:rPr lang="de-DE" smtClean="0"/>
+              <a:rPr lang="de-DE"/>
               <a:t>Vierte Ebene</a:t>
             </a:r>
           </a:p>
           <a:p>
             <a:pPr lvl="4"/>
             <a:r>
-              <a:rPr lang="de-DE" smtClean="0"/>
+              <a:rPr lang="de-DE"/>
               <a:t>Fünfte Ebene</a:t>
             </a:r>
             <a:endParaRPr lang="en-US" dirty="0"/>
@@ -1579,7 +1577,7 @@
           <a:p>
             <a:fld id="{C765E450-76B0-504F-A63B-8180E1F6D185}" type="datetime1">
               <a:rPr lang="de-CH" smtClean="0"/>
-              <a:t>10.12.16</a:t>
+              <a:t>12.12.2016</a:t>
             </a:fld>
             <a:endParaRPr lang="de-DE"/>
           </a:p>
@@ -1601,10 +1599,9 @@
           <a:lstStyle/>
           <a:p>
             <a:r>
-              <a:rPr lang="de-DE" smtClean="0"/>
+              <a:rPr lang="de-DE"/>
               <a:t>Astrid Ytrehorn, Sabine Brunner, Lukas Würsch, Sarah Morillo, Markus Eggimann</a:t>
             </a:r>
-            <a:endParaRPr lang="de-DE"/>
           </a:p>
         </p:txBody>
       </p:sp>
@@ -1625,7 +1622,7 @@
           <a:p>
             <a:fld id="{A26CC7F3-58B4-F847-97F4-EBFB6E880BE1}" type="slidenum">
               <a:rPr lang="de-DE" smtClean="0"/>
-              <a:t>‹Nr.›</a:t>
+              <a:t>‹#›</a:t>
             </a:fld>
             <a:endParaRPr lang="de-DE"/>
           </a:p>
@@ -1777,7 +1774,7 @@
           </a:lstStyle>
           <a:p>
             <a:r>
-              <a:rPr lang="de-DE" smtClean="0"/>
+              <a:rPr lang="de-DE"/>
               <a:t>Mastertitelformat bearbeiten</a:t>
             </a:r>
             <a:endParaRPr lang="en-US" dirty="0"/>
@@ -1898,7 +1895,7 @@
           <a:p>
             <a:pPr lvl="0"/>
             <a:r>
-              <a:rPr lang="de-DE" smtClean="0"/>
+              <a:rPr lang="de-DE"/>
               <a:t>Mastertextformat bearbeiten</a:t>
             </a:r>
           </a:p>
@@ -1921,7 +1918,7 @@
           <a:p>
             <a:fld id="{878954E2-871F-524F-B2C9-C8CDA6E5BBC5}" type="datetime1">
               <a:rPr lang="de-CH" smtClean="0"/>
-              <a:t>10.12.16</a:t>
+              <a:t>12.12.2016</a:t>
             </a:fld>
             <a:endParaRPr lang="de-DE"/>
           </a:p>
@@ -1943,10 +1940,9 @@
           <a:lstStyle/>
           <a:p>
             <a:r>
-              <a:rPr lang="de-DE" smtClean="0"/>
+              <a:rPr lang="de-DE"/>
               <a:t>Astrid Ytrehorn, Sabine Brunner, Lukas Würsch, Sarah Morillo, Markus Eggimann</a:t>
             </a:r>
-            <a:endParaRPr lang="de-DE"/>
           </a:p>
         </p:txBody>
       </p:sp>
@@ -1967,7 +1963,7 @@
           <a:p>
             <a:fld id="{A26CC7F3-58B4-F847-97F4-EBFB6E880BE1}" type="slidenum">
               <a:rPr lang="de-DE" smtClean="0"/>
-              <a:t>‹Nr.›</a:t>
+              <a:t>‹#›</a:t>
             </a:fld>
             <a:endParaRPr lang="de-DE"/>
           </a:p>
@@ -2057,7 +2053,7 @@
           <a:lstStyle/>
           <a:p>
             <a:r>
-              <a:rPr lang="de-DE" smtClean="0"/>
+              <a:rPr lang="de-DE"/>
               <a:t>Mastertitelformat bearbeiten</a:t>
             </a:r>
             <a:endParaRPr lang="en-US" dirty="0"/>
@@ -2086,35 +2082,35 @@
           <a:p>
             <a:pPr lvl="0"/>
             <a:r>
-              <a:rPr lang="de-DE" smtClean="0"/>
+              <a:rPr lang="de-DE"/>
               <a:t>Mastertextformat bearbeiten</a:t>
             </a:r>
           </a:p>
           <a:p>
             <a:pPr lvl="1"/>
             <a:r>
-              <a:rPr lang="de-DE" smtClean="0"/>
+              <a:rPr lang="de-DE"/>
               <a:t>Zweite Ebene</a:t>
             </a:r>
           </a:p>
           <a:p>
             <a:pPr lvl="2"/>
             <a:r>
-              <a:rPr lang="de-DE" smtClean="0"/>
+              <a:rPr lang="de-DE"/>
               <a:t>Dritte Ebene</a:t>
             </a:r>
           </a:p>
           <a:p>
             <a:pPr lvl="3"/>
             <a:r>
-              <a:rPr lang="de-DE" smtClean="0"/>
+              <a:rPr lang="de-DE"/>
               <a:t>Vierte Ebene</a:t>
             </a:r>
           </a:p>
           <a:p>
             <a:pPr lvl="4"/>
             <a:r>
-              <a:rPr lang="de-DE" smtClean="0"/>
+              <a:rPr lang="de-DE"/>
               <a:t>Fünfte Ebene</a:t>
             </a:r>
             <a:endParaRPr lang="en-US" dirty="0"/>
@@ -2143,35 +2139,35 @@
           <a:p>
             <a:pPr lvl="0"/>
             <a:r>
-              <a:rPr lang="de-DE" smtClean="0"/>
+              <a:rPr lang="de-DE"/>
               <a:t>Mastertextformat bearbeiten</a:t>
             </a:r>
           </a:p>
           <a:p>
             <a:pPr lvl="1"/>
             <a:r>
-              <a:rPr lang="de-DE" smtClean="0"/>
+              <a:rPr lang="de-DE"/>
               <a:t>Zweite Ebene</a:t>
             </a:r>
           </a:p>
           <a:p>
             <a:pPr lvl="2"/>
             <a:r>
-              <a:rPr lang="de-DE" smtClean="0"/>
+              <a:rPr lang="de-DE"/>
               <a:t>Dritte Ebene</a:t>
             </a:r>
           </a:p>
           <a:p>
             <a:pPr lvl="3"/>
             <a:r>
-              <a:rPr lang="de-DE" smtClean="0"/>
+              <a:rPr lang="de-DE"/>
               <a:t>Vierte Ebene</a:t>
             </a:r>
           </a:p>
           <a:p>
             <a:pPr lvl="4"/>
             <a:r>
-              <a:rPr lang="de-DE" smtClean="0"/>
+              <a:rPr lang="de-DE"/>
               <a:t>Fünfte Ebene</a:t>
             </a:r>
             <a:endParaRPr lang="en-US" dirty="0"/>
@@ -2195,7 +2191,7 @@
           <a:p>
             <a:fld id="{F7DFBB9B-3A70-3E48-9A6F-4A42487A6AA0}" type="datetime1">
               <a:rPr lang="de-CH" smtClean="0"/>
-              <a:t>10.12.16</a:t>
+              <a:t>12.12.2016</a:t>
             </a:fld>
             <a:endParaRPr lang="de-DE"/>
           </a:p>
@@ -2217,10 +2213,9 @@
           <a:lstStyle/>
           <a:p>
             <a:r>
-              <a:rPr lang="de-DE" smtClean="0"/>
+              <a:rPr lang="de-DE"/>
               <a:t>Astrid Ytrehorn, Sabine Brunner, Lukas Würsch, Sarah Morillo, Markus Eggimann</a:t>
             </a:r>
-            <a:endParaRPr lang="de-DE"/>
           </a:p>
         </p:txBody>
       </p:sp>
@@ -2241,7 +2236,7 @@
           <a:p>
             <a:fld id="{A26CC7F3-58B4-F847-97F4-EBFB6E880BE1}" type="slidenum">
               <a:rPr lang="de-DE" smtClean="0"/>
-              <a:t>‹Nr.›</a:t>
+              <a:t>‹#›</a:t>
             </a:fld>
             <a:endParaRPr lang="de-DE"/>
           </a:p>
@@ -2293,7 +2288,7 @@
           <a:lstStyle/>
           <a:p>
             <a:r>
-              <a:rPr lang="de-DE" smtClean="0"/>
+              <a:rPr lang="de-DE"/>
               <a:t>Mastertitelformat bearbeiten</a:t>
             </a:r>
             <a:endParaRPr lang="en-US" dirty="0"/>
@@ -2365,7 +2360,7 @@
           <a:p>
             <a:pPr lvl="0"/>
             <a:r>
-              <a:rPr lang="de-DE" smtClean="0"/>
+              <a:rPr lang="de-DE"/>
               <a:t>Mastertextformat bearbeiten</a:t>
             </a:r>
           </a:p>
@@ -2393,35 +2388,35 @@
           <a:p>
             <a:pPr lvl="0"/>
             <a:r>
-              <a:rPr lang="de-DE" smtClean="0"/>
+              <a:rPr lang="de-DE"/>
               <a:t>Mastertextformat bearbeiten</a:t>
             </a:r>
           </a:p>
           <a:p>
             <a:pPr lvl="1"/>
             <a:r>
-              <a:rPr lang="de-DE" smtClean="0"/>
+              <a:rPr lang="de-DE"/>
               <a:t>Zweite Ebene</a:t>
             </a:r>
           </a:p>
           <a:p>
             <a:pPr lvl="2"/>
             <a:r>
-              <a:rPr lang="de-DE" smtClean="0"/>
+              <a:rPr lang="de-DE"/>
               <a:t>Dritte Ebene</a:t>
             </a:r>
           </a:p>
           <a:p>
             <a:pPr lvl="3"/>
             <a:r>
-              <a:rPr lang="de-DE" smtClean="0"/>
+              <a:rPr lang="de-DE"/>
               <a:t>Vierte Ebene</a:t>
             </a:r>
           </a:p>
           <a:p>
             <a:pPr lvl="4"/>
             <a:r>
-              <a:rPr lang="de-DE" smtClean="0"/>
+              <a:rPr lang="de-DE"/>
               <a:t>Fünfte Ebene</a:t>
             </a:r>
             <a:endParaRPr lang="en-US" dirty="0"/>
@@ -2493,7 +2488,7 @@
           <a:p>
             <a:pPr lvl="0"/>
             <a:r>
-              <a:rPr lang="de-DE" smtClean="0"/>
+              <a:rPr lang="de-DE"/>
               <a:t>Mastertextformat bearbeiten</a:t>
             </a:r>
           </a:p>
@@ -2521,35 +2516,35 @@
           <a:p>
             <a:pPr lvl="0"/>
             <a:r>
-              <a:rPr lang="de-DE" smtClean="0"/>
+              <a:rPr lang="de-DE"/>
               <a:t>Mastertextformat bearbeiten</a:t>
             </a:r>
           </a:p>
           <a:p>
             <a:pPr lvl="1"/>
             <a:r>
-              <a:rPr lang="de-DE" smtClean="0"/>
+              <a:rPr lang="de-DE"/>
               <a:t>Zweite Ebene</a:t>
             </a:r>
           </a:p>
           <a:p>
             <a:pPr lvl="2"/>
             <a:r>
-              <a:rPr lang="de-DE" smtClean="0"/>
+              <a:rPr lang="de-DE"/>
               <a:t>Dritte Ebene</a:t>
             </a:r>
           </a:p>
           <a:p>
             <a:pPr lvl="3"/>
             <a:r>
-              <a:rPr lang="de-DE" smtClean="0"/>
+              <a:rPr lang="de-DE"/>
               <a:t>Vierte Ebene</a:t>
             </a:r>
           </a:p>
           <a:p>
             <a:pPr lvl="4"/>
             <a:r>
-              <a:rPr lang="de-DE" smtClean="0"/>
+              <a:rPr lang="de-DE"/>
               <a:t>Fünfte Ebene</a:t>
             </a:r>
             <a:endParaRPr lang="en-US" dirty="0"/>
@@ -2573,7 +2568,7 @@
           <a:p>
             <a:fld id="{B2F9FB8C-4434-EF4A-8363-B650369AF631}" type="datetime1">
               <a:rPr lang="de-CH" smtClean="0"/>
-              <a:t>10.12.16</a:t>
+              <a:t>12.12.2016</a:t>
             </a:fld>
             <a:endParaRPr lang="de-DE"/>
           </a:p>
@@ -2595,10 +2590,9 @@
           <a:lstStyle/>
           <a:p>
             <a:r>
-              <a:rPr lang="de-DE" smtClean="0"/>
+              <a:rPr lang="de-DE"/>
               <a:t>Astrid Ytrehorn, Sabine Brunner, Lukas Würsch, Sarah Morillo, Markus Eggimann</a:t>
             </a:r>
-            <a:endParaRPr lang="de-DE"/>
           </a:p>
         </p:txBody>
       </p:sp>
@@ -2619,7 +2613,7 @@
           <a:p>
             <a:fld id="{A26CC7F3-58B4-F847-97F4-EBFB6E880BE1}" type="slidenum">
               <a:rPr lang="de-DE" smtClean="0"/>
-              <a:t>‹Nr.›</a:t>
+              <a:t>‹#›</a:t>
             </a:fld>
             <a:endParaRPr lang="de-DE"/>
           </a:p>
@@ -2666,7 +2660,7 @@
           <a:lstStyle/>
           <a:p>
             <a:r>
-              <a:rPr lang="de-DE" smtClean="0"/>
+              <a:rPr lang="de-DE"/>
               <a:t>Mastertitelformat bearbeiten</a:t>
             </a:r>
             <a:endParaRPr lang="en-US" dirty="0"/>
@@ -2690,7 +2684,7 @@
           <a:p>
             <a:fld id="{24C21B1C-744B-5E41-B0A9-DA6A7E7E1689}" type="datetime1">
               <a:rPr lang="de-CH" smtClean="0"/>
-              <a:t>10.12.16</a:t>
+              <a:t>12.12.2016</a:t>
             </a:fld>
             <a:endParaRPr lang="de-DE"/>
           </a:p>
@@ -2712,10 +2706,9 @@
           <a:lstStyle/>
           <a:p>
             <a:r>
-              <a:rPr lang="de-DE" smtClean="0"/>
+              <a:rPr lang="de-DE"/>
               <a:t>Astrid Ytrehorn, Sabine Brunner, Lukas Würsch, Sarah Morillo, Markus Eggimann</a:t>
             </a:r>
-            <a:endParaRPr lang="de-DE"/>
           </a:p>
         </p:txBody>
       </p:sp>
@@ -2736,7 +2729,7 @@
           <a:p>
             <a:fld id="{A26CC7F3-58B4-F847-97F4-EBFB6E880BE1}" type="slidenum">
               <a:rPr lang="de-DE" smtClean="0"/>
-              <a:t>‹Nr.›</a:t>
+              <a:t>‹#›</a:t>
             </a:fld>
             <a:endParaRPr lang="de-DE"/>
           </a:p>
@@ -2860,7 +2853,7 @@
           <a:p>
             <a:fld id="{991D532B-EF3B-D64E-A74E-AD93852E3D56}" type="datetime1">
               <a:rPr lang="de-CH" smtClean="0"/>
-              <a:t>10.12.16</a:t>
+              <a:t>12.12.2016</a:t>
             </a:fld>
             <a:endParaRPr lang="de-DE"/>
           </a:p>
@@ -2890,10 +2883,9 @@
           </a:lstStyle>
           <a:p>
             <a:r>
-              <a:rPr lang="de-DE" smtClean="0"/>
+              <a:rPr lang="de-DE"/>
               <a:t>Astrid Ytrehorn, Sabine Brunner, Lukas Würsch, Sarah Morillo, Markus Eggimann</a:t>
             </a:r>
-            <a:endParaRPr lang="de-DE"/>
           </a:p>
         </p:txBody>
       </p:sp>
@@ -2914,7 +2906,7 @@
           <a:p>
             <a:fld id="{A26CC7F3-58B4-F847-97F4-EBFB6E880BE1}" type="slidenum">
               <a:rPr lang="de-DE" smtClean="0"/>
-              <a:t>‹Nr.›</a:t>
+              <a:t>‹#›</a:t>
             </a:fld>
             <a:endParaRPr lang="de-DE"/>
           </a:p>
@@ -3052,7 +3044,7 @@
           </a:lstStyle>
           <a:p>
             <a:r>
-              <a:rPr lang="de-DE" smtClean="0"/>
+              <a:rPr lang="de-DE"/>
               <a:t>Mastertitelformat bearbeiten</a:t>
             </a:r>
             <a:endParaRPr lang="en-US" dirty="0"/>
@@ -3081,35 +3073,35 @@
           <a:p>
             <a:pPr lvl="0"/>
             <a:r>
-              <a:rPr lang="de-DE" smtClean="0"/>
+              <a:rPr lang="de-DE"/>
               <a:t>Mastertextformat bearbeiten</a:t>
             </a:r>
           </a:p>
           <a:p>
             <a:pPr lvl="1"/>
             <a:r>
-              <a:rPr lang="de-DE" smtClean="0"/>
+              <a:rPr lang="de-DE"/>
               <a:t>Zweite Ebene</a:t>
             </a:r>
           </a:p>
           <a:p>
             <a:pPr lvl="2"/>
             <a:r>
-              <a:rPr lang="de-DE" smtClean="0"/>
+              <a:rPr lang="de-DE"/>
               <a:t>Dritte Ebene</a:t>
             </a:r>
           </a:p>
           <a:p>
             <a:pPr lvl="3"/>
             <a:r>
-              <a:rPr lang="de-DE" smtClean="0"/>
+              <a:rPr lang="de-DE"/>
               <a:t>Vierte Ebene</a:t>
             </a:r>
           </a:p>
           <a:p>
             <a:pPr lvl="4"/>
             <a:r>
-              <a:rPr lang="de-DE" smtClean="0"/>
+              <a:rPr lang="de-DE"/>
               <a:t>Fünfte Ebene</a:t>
             </a:r>
             <a:endParaRPr lang="en-US" dirty="0"/>
@@ -3181,7 +3173,7 @@
           <a:p>
             <a:pPr lvl="0"/>
             <a:r>
-              <a:rPr lang="de-DE" smtClean="0"/>
+              <a:rPr lang="de-DE"/>
               <a:t>Mastertextformat bearbeiten</a:t>
             </a:r>
           </a:p>
@@ -3213,7 +3205,7 @@
           <a:p>
             <a:fld id="{9AD8DA70-E9E7-F84F-AAEF-5FEC3D21A827}" type="datetime1">
               <a:rPr lang="de-CH" smtClean="0"/>
-              <a:t>10.12.16</a:t>
+              <a:t>12.12.2016</a:t>
             </a:fld>
             <a:endParaRPr lang="de-DE"/>
           </a:p>
@@ -3248,10 +3240,9 @@
           </a:lstStyle>
           <a:p>
             <a:r>
-              <a:rPr lang="de-DE" smtClean="0"/>
+              <a:rPr lang="de-DE"/>
               <a:t>Astrid Ytrehorn, Sabine Brunner, Lukas Würsch, Sarah Morillo, Markus Eggimann</a:t>
             </a:r>
-            <a:endParaRPr lang="de-DE"/>
           </a:p>
         </p:txBody>
       </p:sp>
@@ -3280,7 +3271,7 @@
           <a:p>
             <a:fld id="{A26CC7F3-58B4-F847-97F4-EBFB6E880BE1}" type="slidenum">
               <a:rPr lang="de-DE" smtClean="0"/>
-              <a:t>‹Nr.›</a:t>
+              <a:t>‹#›</a:t>
             </a:fld>
             <a:endParaRPr lang="de-DE"/>
           </a:p>
@@ -3418,7 +3409,7 @@
           </a:lstStyle>
           <a:p>
             <a:r>
-              <a:rPr lang="de-DE" smtClean="0"/>
+              <a:rPr lang="de-DE"/>
               <a:t>Mastertitelformat bearbeiten</a:t>
             </a:r>
             <a:endParaRPr lang="en-US" dirty="0"/>
@@ -3488,7 +3479,7 @@
           </a:lstStyle>
           <a:p>
             <a:r>
-              <a:rPr lang="de-DE" smtClean="0"/>
+              <a:rPr lang="de-DE"/>
               <a:t>Bild auf Platzhalter ziehen oder durch Klicken auf Symbol hinzufügen</a:t>
             </a:r>
             <a:endParaRPr lang="en-US"/>
@@ -3566,7 +3557,7 @@
           <a:p>
             <a:pPr lvl="0"/>
             <a:r>
-              <a:rPr lang="de-DE" smtClean="0"/>
+              <a:rPr lang="de-DE"/>
               <a:t>Mastertextformat bearbeiten</a:t>
             </a:r>
           </a:p>
@@ -3589,7 +3580,7 @@
           <a:p>
             <a:fld id="{14B9A904-C33B-8541-864F-71E4FCB881B7}" type="datetime1">
               <a:rPr lang="de-CH" smtClean="0"/>
-              <a:t>10.12.16</a:t>
+              <a:t>12.12.2016</a:t>
             </a:fld>
             <a:endParaRPr lang="de-DE"/>
           </a:p>
@@ -3611,10 +3602,9 @@
           <a:lstStyle/>
           <a:p>
             <a:r>
-              <a:rPr lang="de-DE" smtClean="0"/>
+              <a:rPr lang="de-DE"/>
               <a:t>Astrid Ytrehorn, Sabine Brunner, Lukas Würsch, Sarah Morillo, Markus Eggimann</a:t>
             </a:r>
-            <a:endParaRPr lang="de-DE"/>
           </a:p>
         </p:txBody>
       </p:sp>
@@ -3635,7 +3625,7 @@
           <a:p>
             <a:fld id="{A26CC7F3-58B4-F847-97F4-EBFB6E880BE1}" type="slidenum">
               <a:rPr lang="de-DE" smtClean="0"/>
-              <a:t>‹Nr.›</a:t>
+              <a:t>‹#›</a:t>
             </a:fld>
             <a:endParaRPr lang="de-DE"/>
           </a:p>
@@ -3773,7 +3763,7 @@
           <a:lstStyle/>
           <a:p>
             <a:r>
-              <a:rPr lang="de-DE" smtClean="0"/>
+              <a:rPr lang="de-DE"/>
               <a:t>Mastertitelformat bearbeiten</a:t>
             </a:r>
             <a:endParaRPr lang="en-US" dirty="0"/>
@@ -3807,35 +3797,35 @@
           <a:p>
             <a:pPr lvl="0"/>
             <a:r>
-              <a:rPr lang="de-DE" smtClean="0"/>
+              <a:rPr lang="de-DE"/>
               <a:t>Mastertextformat bearbeiten</a:t>
             </a:r>
           </a:p>
           <a:p>
             <a:pPr lvl="1"/>
             <a:r>
-              <a:rPr lang="de-DE" smtClean="0"/>
+              <a:rPr lang="de-DE"/>
               <a:t>Zweite Ebene</a:t>
             </a:r>
           </a:p>
           <a:p>
             <a:pPr lvl="2"/>
             <a:r>
-              <a:rPr lang="de-DE" smtClean="0"/>
+              <a:rPr lang="de-DE"/>
               <a:t>Dritte Ebene</a:t>
             </a:r>
           </a:p>
           <a:p>
             <a:pPr lvl="3"/>
             <a:r>
-              <a:rPr lang="de-DE" smtClean="0"/>
+              <a:rPr lang="de-DE"/>
               <a:t>Vierte Ebene</a:t>
             </a:r>
           </a:p>
           <a:p>
             <a:pPr lvl="4"/>
             <a:r>
-              <a:rPr lang="de-DE" smtClean="0"/>
+              <a:rPr lang="de-DE"/>
               <a:t>Fünfte Ebene</a:t>
             </a:r>
             <a:endParaRPr lang="en-US" dirty="0"/>
@@ -3875,7 +3865,7 @@
           <a:p>
             <a:fld id="{DDBFD036-842A-864E-9DA8-57E62B098AC7}" type="datetime1">
               <a:rPr lang="de-CH" smtClean="0"/>
-              <a:t>10.12.16</a:t>
+              <a:t>12.12.2016</a:t>
             </a:fld>
             <a:endParaRPr lang="de-DE"/>
           </a:p>
@@ -3913,10 +3903,9 @@
           </a:lstStyle>
           <a:p>
             <a:r>
-              <a:rPr lang="de-DE" smtClean="0"/>
+              <a:rPr lang="de-DE"/>
               <a:t>Astrid Ytrehorn, Sabine Brunner, Lukas Würsch, Sarah Morillo, Markus Eggimann</a:t>
             </a:r>
-            <a:endParaRPr lang="de-DE"/>
           </a:p>
         </p:txBody>
       </p:sp>
@@ -3953,7 +3942,7 @@
           <a:p>
             <a:fld id="{A26CC7F3-58B4-F847-97F4-EBFB6E880BE1}" type="slidenum">
               <a:rPr lang="de-DE" smtClean="0"/>
-              <a:t>‹Nr.›</a:t>
+              <a:t>‹#›</a:t>
             </a:fld>
             <a:endParaRPr lang="de-DE"/>
           </a:p>
@@ -4428,7 +4417,7 @@
           <a:p>
             <a:pPr algn="l"/>
             <a:r>
-              <a:rPr lang="de-DE" sz="8000" b="1" dirty="0" err="1" smtClean="0"/>
+              <a:rPr lang="de-DE" sz="8000" b="1" dirty="0" err="1"/>
               <a:t>Ithaca</a:t>
             </a:r>
             <a:endParaRPr lang="de-DE" b="1"/>
@@ -4456,18 +4445,17 @@
           <a:lstStyle/>
           <a:p>
             <a:r>
-              <a:rPr lang="de-DE" smtClean="0"/>
+              <a:rPr lang="de-DE"/>
               <a:t>ESE 2016 </a:t>
             </a:r>
             <a:r>
-              <a:rPr lang="mr-IN" smtClean="0"/>
+              <a:rPr lang="mr-IN"/>
               <a:t>–</a:t>
             </a:r>
             <a:r>
-              <a:rPr lang="de-DE" smtClean="0"/>
+              <a:rPr lang="de-DE"/>
               <a:t> Team 3</a:t>
             </a:r>
-            <a:endParaRPr lang="de-DE"/>
           </a:p>
         </p:txBody>
       </p:sp>
@@ -4515,13 +4503,6 @@
   <p:clrMapOvr>
     <a:masterClrMapping/>
   </p:clrMapOvr>
-  <p:timing>
-    <p:tnLst>
-      <p:par>
-        <p:cTn id="1" dur="indefinite" restart="never" nodeType="tmRoot"/>
-      </p:par>
-    </p:tnLst>
-  </p:timing>
 </p:sld>
 </file>
 
@@ -4558,10 +4539,9 @@
           <a:lstStyle/>
           <a:p>
             <a:r>
-              <a:rPr lang="en-GB" dirty="0" smtClean="0"/>
+              <a:rPr lang="en-GB" dirty="0"/>
               <a:t>Table of contents</a:t>
             </a:r>
-            <a:endParaRPr lang="en-GB" dirty="0"/>
           </a:p>
         </p:txBody>
       </p:sp>
@@ -4581,40 +4561,39 @@
           <a:lstStyle/>
           <a:p>
             <a:r>
-              <a:rPr lang="en-GB" dirty="0" smtClean="0"/>
+              <a:rPr lang="en-GB" dirty="0"/>
               <a:t>Features</a:t>
             </a:r>
           </a:p>
           <a:p>
             <a:r>
-              <a:rPr lang="en-GB" dirty="0" smtClean="0"/>
+              <a:rPr lang="en-GB" dirty="0"/>
               <a:t>Demo of the product</a:t>
             </a:r>
           </a:p>
           <a:p>
             <a:r>
-              <a:rPr lang="en-GB" dirty="0" smtClean="0"/>
+              <a:rPr lang="en-GB" dirty="0"/>
               <a:t>Development process</a:t>
             </a:r>
           </a:p>
           <a:p>
             <a:r>
-              <a:rPr lang="en-GB" dirty="0" smtClean="0"/>
+              <a:rPr lang="en-GB" dirty="0"/>
               <a:t>Challenges</a:t>
             </a:r>
           </a:p>
           <a:p>
             <a:r>
-              <a:rPr lang="en-GB" dirty="0" smtClean="0"/>
+              <a:rPr lang="en-GB" dirty="0"/>
               <a:t>Prospects</a:t>
             </a:r>
           </a:p>
           <a:p>
             <a:r>
-              <a:rPr lang="en-GB" dirty="0" smtClean="0"/>
+              <a:rPr lang="en-GB" dirty="0"/>
               <a:t>Questions</a:t>
             </a:r>
-            <a:endParaRPr lang="en-GB" dirty="0"/>
           </a:p>
         </p:txBody>
       </p:sp>
@@ -4628,13 +4607,6 @@
   <p:clrMapOvr>
     <a:masterClrMapping/>
   </p:clrMapOvr>
-  <p:timing>
-    <p:tnLst>
-      <p:par>
-        <p:cTn id="1" dur="indefinite" restart="never" nodeType="tmRoot"/>
-      </p:par>
-    </p:tnLst>
-  </p:timing>
 </p:sld>
 </file>
 
@@ -4657,6 +4629,145 @@
       </p:grpSpPr>
       <p:sp>
         <p:nvSpPr>
+          <p:cNvPr id="2" name="Title 1"/>
+          <p:cNvSpPr>
+            <a:spLocks noGrp="1"/>
+          </p:cNvSpPr>
+          <p:nvPr>
+            <p:ph type="title"/>
+          </p:nvPr>
+        </p:nvSpPr>
+        <p:spPr/>
+        <p:txBody>
+          <a:bodyPr/>
+          <a:lstStyle/>
+          <a:p>
+            <a:r>
+              <a:rPr lang="de-CH" dirty="0"/>
+              <a:t>Feature</a:t>
+            </a:r>
+          </a:p>
+        </p:txBody>
+      </p:sp>
+      <p:sp>
+        <p:nvSpPr>
+          <p:cNvPr id="3" name="Content Placeholder 2"/>
+          <p:cNvSpPr>
+            <a:spLocks noGrp="1"/>
+          </p:cNvSpPr>
+          <p:nvPr>
+            <p:ph idx="1"/>
+          </p:nvPr>
+        </p:nvSpPr>
+        <p:spPr/>
+        <p:txBody>
+          <a:bodyPr/>
+          <a:lstStyle/>
+          <a:p>
+            <a:endParaRPr lang="de-CH" dirty="0"/>
+          </a:p>
+        </p:txBody>
+      </p:sp>
+    </p:spTree>
+    <p:extLst>
+      <p:ext uri="{BB962C8B-B14F-4D97-AF65-F5344CB8AC3E}">
+        <p14:creationId xmlns:p14="http://schemas.microsoft.com/office/powerpoint/2010/main" val="2203899565"/>
+      </p:ext>
+    </p:extLst>
+  </p:cSld>
+  <p:clrMapOvr>
+    <a:masterClrMapping/>
+  </p:clrMapOvr>
+</p:sld>
+</file>
+
+<file path=ppt/slides/slide4.xml><?xml version="1.0" encoding="utf-8"?>
+<p:sld xmlns:a="http://schemas.openxmlformats.org/drawingml/2006/main" xmlns:r="http://schemas.openxmlformats.org/officeDocument/2006/relationships" xmlns:p="http://schemas.openxmlformats.org/presentationml/2006/main">
+  <p:cSld>
+    <p:spTree>
+      <p:nvGrpSpPr>
+        <p:cNvPr id="1" name=""/>
+        <p:cNvGrpSpPr/>
+        <p:nvPr/>
+      </p:nvGrpSpPr>
+      <p:grpSpPr>
+        <a:xfrm>
+          <a:off x="0" y="0"/>
+          <a:ext cx="0" cy="0"/>
+          <a:chOff x="0" y="0"/>
+          <a:chExt cx="0" cy="0"/>
+        </a:xfrm>
+      </p:grpSpPr>
+      <p:sp>
+        <p:nvSpPr>
+          <p:cNvPr id="2" name="Title 1"/>
+          <p:cNvSpPr>
+            <a:spLocks noGrp="1"/>
+          </p:cNvSpPr>
+          <p:nvPr>
+            <p:ph type="title"/>
+          </p:nvPr>
+        </p:nvSpPr>
+        <p:spPr/>
+        <p:txBody>
+          <a:bodyPr/>
+          <a:lstStyle/>
+          <a:p>
+            <a:endParaRPr lang="de-CH"/>
+          </a:p>
+        </p:txBody>
+      </p:sp>
+      <p:sp>
+        <p:nvSpPr>
+          <p:cNvPr id="3" name="Content Placeholder 2"/>
+          <p:cNvSpPr>
+            <a:spLocks noGrp="1"/>
+          </p:cNvSpPr>
+          <p:nvPr>
+            <p:ph idx="1"/>
+          </p:nvPr>
+        </p:nvSpPr>
+        <p:spPr/>
+        <p:txBody>
+          <a:bodyPr/>
+          <a:lstStyle/>
+          <a:p>
+            <a:endParaRPr lang="de-CH"/>
+          </a:p>
+        </p:txBody>
+      </p:sp>
+    </p:spTree>
+    <p:extLst>
+      <p:ext uri="{BB962C8B-B14F-4D97-AF65-F5344CB8AC3E}">
+        <p14:creationId xmlns:p14="http://schemas.microsoft.com/office/powerpoint/2010/main" val="414751740"/>
+      </p:ext>
+    </p:extLst>
+  </p:cSld>
+  <p:clrMapOvr>
+    <a:masterClrMapping/>
+  </p:clrMapOvr>
+</p:sld>
+</file>
+
+<file path=ppt/slides/slide5.xml><?xml version="1.0" encoding="utf-8"?>
+<p:sld xmlns:a="http://schemas.openxmlformats.org/drawingml/2006/main" xmlns:r="http://schemas.openxmlformats.org/officeDocument/2006/relationships" xmlns:p="http://schemas.openxmlformats.org/presentationml/2006/main">
+  <p:cSld>
+    <p:spTree>
+      <p:nvGrpSpPr>
+        <p:cNvPr id="1" name=""/>
+        <p:cNvGrpSpPr/>
+        <p:nvPr/>
+      </p:nvGrpSpPr>
+      <p:grpSpPr>
+        <a:xfrm>
+          <a:off x="0" y="0"/>
+          <a:ext cx="0" cy="0"/>
+          <a:chOff x="0" y="0"/>
+          <a:chExt cx="0" cy="0"/>
+        </a:xfrm>
+      </p:grpSpPr>
+      <p:sp>
+        <p:nvSpPr>
           <p:cNvPr id="2" name="Titel 1"/>
           <p:cNvSpPr>
             <a:spLocks noGrp="1"/>
@@ -4671,11 +4782,11 @@
           <a:lstStyle/>
           <a:p>
             <a:r>
-              <a:rPr lang="de-DE" dirty="0" smtClean="0"/>
+              <a:rPr lang="de-DE" dirty="0"/>
               <a:t>Development </a:t>
             </a:r>
             <a:r>
-              <a:rPr lang="de-DE" dirty="0" err="1" smtClean="0"/>
+              <a:rPr lang="de-DE" dirty="0" err="1"/>
               <a:t>process</a:t>
             </a:r>
             <a:endParaRPr lang="de-DE" dirty="0"/>
@@ -4698,44 +4809,44 @@
           <a:lstStyle/>
           <a:p>
             <a:r>
-              <a:rPr lang="de-DE" dirty="0" err="1" smtClean="0"/>
+              <a:rPr lang="de-DE" dirty="0" err="1"/>
               <a:t>Weekly</a:t>
             </a:r>
             <a:r>
-              <a:rPr lang="de-DE" dirty="0" smtClean="0"/>
+              <a:rPr lang="de-DE" dirty="0"/>
               <a:t> Meetings</a:t>
             </a:r>
           </a:p>
           <a:p>
             <a:r>
-              <a:rPr lang="de-DE" dirty="0" err="1" smtClean="0"/>
+              <a:rPr lang="de-DE" dirty="0" err="1"/>
               <a:t>Github</a:t>
             </a:r>
             <a:r>
-              <a:rPr lang="de-DE" dirty="0" smtClean="0"/>
+              <a:rPr lang="de-DE" dirty="0"/>
               <a:t> </a:t>
             </a:r>
             <a:r>
-              <a:rPr lang="de-DE" dirty="0" err="1" smtClean="0"/>
+              <a:rPr lang="de-DE" dirty="0" err="1"/>
               <a:t>project</a:t>
             </a:r>
-            <a:endParaRPr lang="de-DE" dirty="0" smtClean="0"/>
+            <a:endParaRPr lang="de-DE" dirty="0"/>
           </a:p>
           <a:p>
             <a:pPr lvl="1"/>
             <a:r>
-              <a:rPr lang="de-DE" dirty="0" err="1" smtClean="0"/>
+              <a:rPr lang="de-DE" dirty="0" err="1"/>
               <a:t>Issues</a:t>
             </a:r>
-            <a:endParaRPr lang="de-DE" dirty="0" smtClean="0"/>
+            <a:endParaRPr lang="de-DE" dirty="0"/>
           </a:p>
           <a:p>
             <a:pPr lvl="1"/>
-            <a:endParaRPr lang="de-DE" dirty="0" smtClean="0"/>
+            <a:endParaRPr lang="de-DE" dirty="0"/>
           </a:p>
           <a:p>
             <a:pPr lvl="1"/>
-            <a:endParaRPr lang="de-DE" dirty="0" smtClean="0"/>
+            <a:endParaRPr lang="de-DE" dirty="0"/>
           </a:p>
           <a:p>
             <a:endParaRPr lang="de-DE" dirty="0"/>
@@ -4781,343 +4892,6 @@
   <p:clrMapOvr>
     <a:masterClrMapping/>
   </p:clrMapOvr>
-  <p:timing>
-    <p:tnLst>
-      <p:par>
-        <p:cTn id="1" dur="indefinite" restart="never" nodeType="tmRoot"/>
-      </p:par>
-    </p:tnLst>
-  </p:timing>
-</p:sld>
-</file>
-
-<file path=ppt/slides/slide4.xml><?xml version="1.0" encoding="utf-8"?>
-<p:sld xmlns:a="http://schemas.openxmlformats.org/drawingml/2006/main" xmlns:r="http://schemas.openxmlformats.org/officeDocument/2006/relationships" xmlns:p="http://schemas.openxmlformats.org/presentationml/2006/main">
-  <p:cSld>
-    <p:spTree>
-      <p:nvGrpSpPr>
-        <p:cNvPr id="1" name=""/>
-        <p:cNvGrpSpPr/>
-        <p:nvPr/>
-      </p:nvGrpSpPr>
-      <p:grpSpPr>
-        <a:xfrm>
-          <a:off x="0" y="0"/>
-          <a:ext cx="0" cy="0"/>
-          <a:chOff x="0" y="0"/>
-          <a:chExt cx="0" cy="0"/>
-        </a:xfrm>
-      </p:grpSpPr>
-      <p:sp>
-        <p:nvSpPr>
-          <p:cNvPr id="2" name="Titel 1"/>
-          <p:cNvSpPr>
-            <a:spLocks noGrp="1"/>
-          </p:cNvSpPr>
-          <p:nvPr>
-            <p:ph type="title"/>
-          </p:nvPr>
-        </p:nvSpPr>
-        <p:spPr/>
-        <p:txBody>
-          <a:bodyPr/>
-          <a:lstStyle/>
-          <a:p>
-            <a:r>
-              <a:rPr lang="de-DE" dirty="0" err="1" smtClean="0"/>
-              <a:t>Challenges</a:t>
-            </a:r>
-            <a:endParaRPr lang="de-DE" dirty="0"/>
-          </a:p>
-        </p:txBody>
-      </p:sp>
-      <p:sp>
-        <p:nvSpPr>
-          <p:cNvPr id="3" name="Inhaltsplatzhalter 2"/>
-          <p:cNvSpPr>
-            <a:spLocks noGrp="1"/>
-          </p:cNvSpPr>
-          <p:nvPr>
-            <p:ph idx="1"/>
-          </p:nvPr>
-        </p:nvSpPr>
-        <p:spPr/>
-        <p:txBody>
-          <a:bodyPr/>
-          <a:lstStyle/>
-          <a:p>
-            <a:r>
-              <a:rPr lang="de-DE" dirty="0" smtClean="0"/>
-              <a:t>Understanding </a:t>
-            </a:r>
-            <a:r>
-              <a:rPr lang="de-DE" dirty="0" err="1" smtClean="0"/>
-              <a:t>existing</a:t>
-            </a:r>
-            <a:r>
-              <a:rPr lang="de-DE" dirty="0" smtClean="0"/>
-              <a:t> </a:t>
-            </a:r>
-            <a:r>
-              <a:rPr lang="de-DE" dirty="0" err="1" smtClean="0"/>
-              <a:t>code</a:t>
-            </a:r>
-            <a:endParaRPr lang="de-DE" dirty="0" smtClean="0"/>
-          </a:p>
-          <a:p>
-            <a:r>
-              <a:rPr lang="de-DE" dirty="0" err="1" smtClean="0"/>
-              <a:t>Steep</a:t>
-            </a:r>
-            <a:r>
-              <a:rPr lang="de-DE" dirty="0" smtClean="0"/>
-              <a:t> </a:t>
-            </a:r>
-            <a:r>
-              <a:rPr lang="de-DE" dirty="0" err="1" smtClean="0"/>
-              <a:t>learning</a:t>
-            </a:r>
-            <a:r>
-              <a:rPr lang="de-DE" dirty="0" smtClean="0"/>
-              <a:t> </a:t>
-            </a:r>
-            <a:r>
-              <a:rPr lang="de-DE" dirty="0" err="1" smtClean="0"/>
-              <a:t>curve</a:t>
-            </a:r>
-            <a:endParaRPr lang="de-DE" dirty="0" smtClean="0"/>
-          </a:p>
-          <a:p>
-            <a:r>
-              <a:rPr lang="de-DE" dirty="0" smtClean="0"/>
-              <a:t>Legacy </a:t>
-            </a:r>
-            <a:r>
-              <a:rPr lang="de-DE" dirty="0" err="1" smtClean="0"/>
-              <a:t>bugs</a:t>
-            </a:r>
-            <a:endParaRPr lang="de-DE" dirty="0" smtClean="0"/>
-          </a:p>
-          <a:p>
-            <a:r>
-              <a:rPr lang="de-DE" dirty="0" err="1" smtClean="0"/>
-              <a:t>Usage</a:t>
-            </a:r>
-            <a:r>
-              <a:rPr lang="de-DE" dirty="0" smtClean="0"/>
-              <a:t> </a:t>
-            </a:r>
-            <a:r>
-              <a:rPr lang="de-DE" dirty="0" err="1" smtClean="0"/>
-              <a:t>of</a:t>
-            </a:r>
-            <a:r>
-              <a:rPr lang="de-DE" dirty="0" smtClean="0"/>
-              <a:t> </a:t>
-            </a:r>
-            <a:r>
-              <a:rPr lang="de-DE" dirty="0" err="1" smtClean="0"/>
-              <a:t>bootstrap</a:t>
-            </a:r>
-            <a:endParaRPr lang="de-DE" dirty="0" smtClean="0"/>
-          </a:p>
-          <a:p>
-            <a:endParaRPr lang="de-DE" dirty="0"/>
-          </a:p>
-        </p:txBody>
-      </p:sp>
-    </p:spTree>
-    <p:extLst>
-      <p:ext uri="{BB962C8B-B14F-4D97-AF65-F5344CB8AC3E}">
-        <p14:creationId xmlns:p14="http://schemas.microsoft.com/office/powerpoint/2010/main" val="1644463721"/>
-      </p:ext>
-    </p:extLst>
-  </p:cSld>
-  <p:clrMapOvr>
-    <a:masterClrMapping/>
-  </p:clrMapOvr>
-  <p:timing>
-    <p:tnLst>
-      <p:par>
-        <p:cTn id="1" dur="indefinite" restart="never" nodeType="tmRoot"/>
-      </p:par>
-    </p:tnLst>
-  </p:timing>
-</p:sld>
-</file>
-
-<file path=ppt/slides/slide5.xml><?xml version="1.0" encoding="utf-8"?>
-<p:sld xmlns:a="http://schemas.openxmlformats.org/drawingml/2006/main" xmlns:r="http://schemas.openxmlformats.org/officeDocument/2006/relationships" xmlns:p="http://schemas.openxmlformats.org/presentationml/2006/main">
-  <p:cSld>
-    <p:spTree>
-      <p:nvGrpSpPr>
-        <p:cNvPr id="1" name=""/>
-        <p:cNvGrpSpPr/>
-        <p:nvPr/>
-      </p:nvGrpSpPr>
-      <p:grpSpPr>
-        <a:xfrm>
-          <a:off x="0" y="0"/>
-          <a:ext cx="0" cy="0"/>
-          <a:chOff x="0" y="0"/>
-          <a:chExt cx="0" cy="0"/>
-        </a:xfrm>
-      </p:grpSpPr>
-      <p:sp>
-        <p:nvSpPr>
-          <p:cNvPr id="2" name="Titel 1"/>
-          <p:cNvSpPr>
-            <a:spLocks noGrp="1"/>
-          </p:cNvSpPr>
-          <p:nvPr>
-            <p:ph type="title"/>
-          </p:nvPr>
-        </p:nvSpPr>
-        <p:spPr/>
-        <p:txBody>
-          <a:bodyPr/>
-          <a:lstStyle/>
-          <a:p>
-            <a:r>
-              <a:rPr lang="de-DE" dirty="0" err="1" smtClean="0"/>
-              <a:t>Prospects</a:t>
-            </a:r>
-            <a:endParaRPr lang="de-DE" dirty="0"/>
-          </a:p>
-        </p:txBody>
-      </p:sp>
-      <p:sp>
-        <p:nvSpPr>
-          <p:cNvPr id="3" name="Inhaltsplatzhalter 2"/>
-          <p:cNvSpPr>
-            <a:spLocks noGrp="1"/>
-          </p:cNvSpPr>
-          <p:nvPr>
-            <p:ph idx="1"/>
-          </p:nvPr>
-        </p:nvSpPr>
-        <p:spPr/>
-        <p:txBody>
-          <a:bodyPr/>
-          <a:lstStyle/>
-          <a:p>
-            <a:r>
-              <a:rPr lang="de-DE" dirty="0" smtClean="0"/>
-              <a:t>Additional </a:t>
-            </a:r>
-            <a:r>
-              <a:rPr lang="de-DE" dirty="0" err="1" smtClean="0"/>
-              <a:t>benefits</a:t>
-            </a:r>
-            <a:r>
-              <a:rPr lang="de-DE" dirty="0" smtClean="0"/>
-              <a:t> </a:t>
-            </a:r>
-            <a:r>
-              <a:rPr lang="de-DE" dirty="0" err="1" smtClean="0"/>
-              <a:t>for</a:t>
-            </a:r>
-            <a:r>
-              <a:rPr lang="de-DE" dirty="0" smtClean="0"/>
-              <a:t> premium </a:t>
-            </a:r>
-            <a:r>
-              <a:rPr lang="de-DE" dirty="0" err="1" smtClean="0"/>
-              <a:t>users</a:t>
-            </a:r>
-            <a:endParaRPr lang="de-DE" dirty="0" smtClean="0"/>
-          </a:p>
-          <a:p>
-            <a:r>
-              <a:rPr lang="de-DE" dirty="0" smtClean="0"/>
-              <a:t>Rating </a:t>
-            </a:r>
-            <a:r>
-              <a:rPr lang="de-DE" dirty="0" err="1" smtClean="0"/>
-              <a:t>of</a:t>
-            </a:r>
-            <a:r>
-              <a:rPr lang="de-DE" dirty="0" smtClean="0"/>
-              <a:t> </a:t>
-            </a:r>
-            <a:r>
-              <a:rPr lang="de-DE" dirty="0" err="1" smtClean="0"/>
-              <a:t>ads</a:t>
-            </a:r>
-            <a:r>
-              <a:rPr lang="de-DE" dirty="0" smtClean="0"/>
-              <a:t>, </a:t>
-            </a:r>
-            <a:r>
-              <a:rPr lang="de-DE" dirty="0" err="1" smtClean="0"/>
-              <a:t>users</a:t>
-            </a:r>
-            <a:r>
-              <a:rPr lang="de-DE" dirty="0" smtClean="0"/>
-              <a:t>, </a:t>
-            </a:r>
-            <a:r>
-              <a:rPr lang="de-DE" dirty="0" err="1" smtClean="0"/>
-              <a:t>auctions</a:t>
-            </a:r>
-            <a:r>
-              <a:rPr lang="de-DE" dirty="0"/>
-              <a:t> </a:t>
-            </a:r>
-            <a:r>
-              <a:rPr lang="de-DE" dirty="0" smtClean="0"/>
-              <a:t>...</a:t>
-            </a:r>
-          </a:p>
-          <a:p>
-            <a:r>
-              <a:rPr lang="de-DE" dirty="0" smtClean="0"/>
-              <a:t>Additional real </a:t>
-            </a:r>
-            <a:r>
-              <a:rPr lang="de-DE" dirty="0" err="1" smtClean="0"/>
-              <a:t>estate</a:t>
-            </a:r>
-            <a:r>
-              <a:rPr lang="de-DE" dirty="0" smtClean="0"/>
-              <a:t> </a:t>
-            </a:r>
-            <a:r>
-              <a:rPr lang="de-DE" dirty="0" err="1" smtClean="0"/>
-              <a:t>management</a:t>
-            </a:r>
-            <a:r>
-              <a:rPr lang="de-DE" dirty="0" smtClean="0"/>
-              <a:t> </a:t>
-            </a:r>
-            <a:r>
-              <a:rPr lang="de-DE" dirty="0" err="1" smtClean="0"/>
-              <a:t>functions</a:t>
-            </a:r>
-            <a:endParaRPr lang="de-DE" dirty="0" smtClean="0"/>
-          </a:p>
-          <a:p>
-            <a:endParaRPr lang="de-DE" dirty="0" smtClean="0"/>
-          </a:p>
-        </p:txBody>
-      </p:sp>
-    </p:spTree>
-    <p:extLst>
-      <p:ext uri="{BB962C8B-B14F-4D97-AF65-F5344CB8AC3E}">
-        <p14:creationId xmlns:p14="http://schemas.microsoft.com/office/powerpoint/2010/main" val="1491275702"/>
-      </p:ext>
-    </p:extLst>
-  </p:cSld>
-  <p:clrMapOvr>
-    <a:masterClrMapping/>
-  </p:clrMapOvr>
-  <p:timing>
-    <p:tnLst>
-      <p:par>
-        <p:cTn id="1" dur="indefinite" restart="never" nodeType="tmRoot"/>
-      </p:par>
-    </p:tnLst>
-  </p:timing>
 </p:sld>
 </file>
 
@@ -5140,6 +4914,318 @@
       </p:grpSpPr>
       <p:sp>
         <p:nvSpPr>
+          <p:cNvPr id="2" name="Titel 1"/>
+          <p:cNvSpPr>
+            <a:spLocks noGrp="1"/>
+          </p:cNvSpPr>
+          <p:nvPr>
+            <p:ph type="title"/>
+          </p:nvPr>
+        </p:nvSpPr>
+        <p:spPr/>
+        <p:txBody>
+          <a:bodyPr/>
+          <a:lstStyle/>
+          <a:p>
+            <a:r>
+              <a:rPr lang="de-DE" dirty="0" err="1"/>
+              <a:t>Challenges</a:t>
+            </a:r>
+            <a:endParaRPr lang="de-DE" dirty="0"/>
+          </a:p>
+        </p:txBody>
+      </p:sp>
+      <p:sp>
+        <p:nvSpPr>
+          <p:cNvPr id="3" name="Inhaltsplatzhalter 2"/>
+          <p:cNvSpPr>
+            <a:spLocks noGrp="1"/>
+          </p:cNvSpPr>
+          <p:nvPr>
+            <p:ph idx="1"/>
+          </p:nvPr>
+        </p:nvSpPr>
+        <p:spPr/>
+        <p:txBody>
+          <a:bodyPr/>
+          <a:lstStyle/>
+          <a:p>
+            <a:r>
+              <a:rPr lang="de-DE" dirty="0"/>
+              <a:t>Understanding </a:t>
+            </a:r>
+            <a:r>
+              <a:rPr lang="de-DE" dirty="0" err="1"/>
+              <a:t>existing</a:t>
+            </a:r>
+            <a:r>
+              <a:rPr lang="de-DE" dirty="0"/>
+              <a:t> </a:t>
+            </a:r>
+            <a:r>
+              <a:rPr lang="de-DE" dirty="0" err="1"/>
+              <a:t>code</a:t>
+            </a:r>
+            <a:endParaRPr lang="de-DE" dirty="0"/>
+          </a:p>
+          <a:p>
+            <a:r>
+              <a:rPr lang="de-DE" dirty="0" err="1"/>
+              <a:t>Steep</a:t>
+            </a:r>
+            <a:r>
+              <a:rPr lang="de-DE" dirty="0"/>
+              <a:t> </a:t>
+            </a:r>
+            <a:r>
+              <a:rPr lang="de-DE" dirty="0" err="1"/>
+              <a:t>learning</a:t>
+            </a:r>
+            <a:r>
+              <a:rPr lang="de-DE" dirty="0"/>
+              <a:t> </a:t>
+            </a:r>
+            <a:r>
+              <a:rPr lang="de-DE" dirty="0" err="1"/>
+              <a:t>curve</a:t>
+            </a:r>
+            <a:endParaRPr lang="de-DE" dirty="0"/>
+          </a:p>
+          <a:p>
+            <a:r>
+              <a:rPr lang="de-DE" dirty="0"/>
+              <a:t>Legacy </a:t>
+            </a:r>
+            <a:r>
+              <a:rPr lang="de-DE" dirty="0" err="1"/>
+              <a:t>bugs</a:t>
+            </a:r>
+            <a:endParaRPr lang="de-DE" dirty="0"/>
+          </a:p>
+          <a:p>
+            <a:r>
+              <a:rPr lang="de-DE" dirty="0" err="1"/>
+              <a:t>Usage</a:t>
+            </a:r>
+            <a:r>
+              <a:rPr lang="de-DE" dirty="0"/>
+              <a:t> </a:t>
+            </a:r>
+            <a:r>
+              <a:rPr lang="de-DE" dirty="0" err="1"/>
+              <a:t>of</a:t>
+            </a:r>
+            <a:r>
+              <a:rPr lang="de-DE" dirty="0"/>
+              <a:t> </a:t>
+            </a:r>
+            <a:r>
+              <a:rPr lang="de-DE" dirty="0" err="1"/>
+              <a:t>bootstrap</a:t>
+            </a:r>
+            <a:endParaRPr lang="de-DE" dirty="0"/>
+          </a:p>
+          <a:p>
+            <a:endParaRPr lang="de-DE" dirty="0"/>
+          </a:p>
+        </p:txBody>
+      </p:sp>
+    </p:spTree>
+    <p:extLst>
+      <p:ext uri="{BB962C8B-B14F-4D97-AF65-F5344CB8AC3E}">
+        <p14:creationId xmlns:p14="http://schemas.microsoft.com/office/powerpoint/2010/main" val="1644463721"/>
+      </p:ext>
+    </p:extLst>
+  </p:cSld>
+  <p:clrMapOvr>
+    <a:masterClrMapping/>
+  </p:clrMapOvr>
+</p:sld>
+</file>
+
+<file path=ppt/slides/slide7.xml><?xml version="1.0" encoding="utf-8"?>
+<p:sld xmlns:a="http://schemas.openxmlformats.org/drawingml/2006/main" xmlns:r="http://schemas.openxmlformats.org/officeDocument/2006/relationships" xmlns:p="http://schemas.openxmlformats.org/presentationml/2006/main">
+  <p:cSld>
+    <p:spTree>
+      <p:nvGrpSpPr>
+        <p:cNvPr id="1" name=""/>
+        <p:cNvGrpSpPr/>
+        <p:nvPr/>
+      </p:nvGrpSpPr>
+      <p:grpSpPr>
+        <a:xfrm>
+          <a:off x="0" y="0"/>
+          <a:ext cx="0" cy="0"/>
+          <a:chOff x="0" y="0"/>
+          <a:chExt cx="0" cy="0"/>
+        </a:xfrm>
+      </p:grpSpPr>
+      <p:sp>
+        <p:nvSpPr>
+          <p:cNvPr id="2" name="Titel 1"/>
+          <p:cNvSpPr>
+            <a:spLocks noGrp="1"/>
+          </p:cNvSpPr>
+          <p:nvPr>
+            <p:ph type="title"/>
+          </p:nvPr>
+        </p:nvSpPr>
+        <p:spPr/>
+        <p:txBody>
+          <a:bodyPr/>
+          <a:lstStyle/>
+          <a:p>
+            <a:r>
+              <a:rPr lang="de-DE" dirty="0" err="1"/>
+              <a:t>Prospects</a:t>
+            </a:r>
+            <a:endParaRPr lang="de-DE" dirty="0"/>
+          </a:p>
+        </p:txBody>
+      </p:sp>
+      <p:sp>
+        <p:nvSpPr>
+          <p:cNvPr id="3" name="Inhaltsplatzhalter 2"/>
+          <p:cNvSpPr>
+            <a:spLocks noGrp="1"/>
+          </p:cNvSpPr>
+          <p:nvPr>
+            <p:ph idx="1"/>
+          </p:nvPr>
+        </p:nvSpPr>
+        <p:spPr/>
+        <p:txBody>
+          <a:bodyPr/>
+          <a:lstStyle/>
+          <a:p>
+            <a:r>
+              <a:rPr lang="de-DE" dirty="0"/>
+              <a:t>Additional </a:t>
+            </a:r>
+            <a:r>
+              <a:rPr lang="de-DE" dirty="0" err="1"/>
+              <a:t>benefits</a:t>
+            </a:r>
+            <a:r>
+              <a:rPr lang="de-DE" dirty="0"/>
+              <a:t> </a:t>
+            </a:r>
+            <a:r>
+              <a:rPr lang="de-DE" dirty="0" err="1"/>
+              <a:t>for</a:t>
+            </a:r>
+            <a:r>
+              <a:rPr lang="de-DE" dirty="0"/>
+              <a:t> premium </a:t>
+            </a:r>
+            <a:r>
+              <a:rPr lang="de-DE" dirty="0" err="1"/>
+              <a:t>users</a:t>
+            </a:r>
+            <a:endParaRPr lang="de-DE" dirty="0"/>
+          </a:p>
+          <a:p>
+            <a:r>
+              <a:rPr lang="de-DE" dirty="0"/>
+              <a:t>Rating </a:t>
+            </a:r>
+            <a:r>
+              <a:rPr lang="de-DE" dirty="0" err="1"/>
+              <a:t>of</a:t>
+            </a:r>
+            <a:r>
+              <a:rPr lang="de-DE" dirty="0"/>
+              <a:t> </a:t>
+            </a:r>
+            <a:r>
+              <a:rPr lang="de-DE" dirty="0" err="1"/>
+              <a:t>ads</a:t>
+            </a:r>
+            <a:r>
+              <a:rPr lang="de-DE" dirty="0"/>
+              <a:t>, </a:t>
+            </a:r>
+            <a:r>
+              <a:rPr lang="de-DE" dirty="0" err="1"/>
+              <a:t>users</a:t>
+            </a:r>
+            <a:r>
+              <a:rPr lang="de-DE" dirty="0"/>
+              <a:t>, </a:t>
+            </a:r>
+            <a:r>
+              <a:rPr lang="de-DE" dirty="0" err="1"/>
+              <a:t>auctions</a:t>
+            </a:r>
+            <a:r>
+              <a:rPr lang="de-DE" dirty="0"/>
+              <a:t> ...</a:t>
+            </a:r>
+          </a:p>
+          <a:p>
+            <a:r>
+              <a:rPr lang="de-DE" dirty="0"/>
+              <a:t>Additional real </a:t>
+            </a:r>
+            <a:r>
+              <a:rPr lang="de-DE" dirty="0" err="1"/>
+              <a:t>estate</a:t>
+            </a:r>
+            <a:r>
+              <a:rPr lang="de-DE" dirty="0"/>
+              <a:t> </a:t>
+            </a:r>
+            <a:r>
+              <a:rPr lang="de-DE" dirty="0" err="1"/>
+              <a:t>management</a:t>
+            </a:r>
+            <a:r>
+              <a:rPr lang="de-DE" dirty="0"/>
+              <a:t> </a:t>
+            </a:r>
+            <a:r>
+              <a:rPr lang="de-DE" dirty="0" err="1"/>
+              <a:t>functions</a:t>
+            </a:r>
+            <a:endParaRPr lang="de-DE" dirty="0"/>
+          </a:p>
+          <a:p>
+            <a:endParaRPr lang="de-DE" dirty="0"/>
+          </a:p>
+        </p:txBody>
+      </p:sp>
+    </p:spTree>
+    <p:extLst>
+      <p:ext uri="{BB962C8B-B14F-4D97-AF65-F5344CB8AC3E}">
+        <p14:creationId xmlns:p14="http://schemas.microsoft.com/office/powerpoint/2010/main" val="1491275702"/>
+      </p:ext>
+    </p:extLst>
+  </p:cSld>
+  <p:clrMapOvr>
+    <a:masterClrMapping/>
+  </p:clrMapOvr>
+</p:sld>
+</file>
+
+<file path=ppt/slides/slide8.xml><?xml version="1.0" encoding="utf-8"?>
+<p:sld xmlns:a="http://schemas.openxmlformats.org/drawingml/2006/main" xmlns:r="http://schemas.openxmlformats.org/officeDocument/2006/relationships" xmlns:p="http://schemas.openxmlformats.org/presentationml/2006/main">
+  <p:cSld>
+    <p:spTree>
+      <p:nvGrpSpPr>
+        <p:cNvPr id="1" name=""/>
+        <p:cNvGrpSpPr/>
+        <p:nvPr/>
+      </p:nvGrpSpPr>
+      <p:grpSpPr>
+        <a:xfrm>
+          <a:off x="0" y="0"/>
+          <a:ext cx="0" cy="0"/>
+          <a:chOff x="0" y="0"/>
+          <a:chExt cx="0" cy="0"/>
+        </a:xfrm>
+      </p:grpSpPr>
+      <p:sp>
+        <p:nvSpPr>
           <p:cNvPr id="5" name="Titel 4"/>
           <p:cNvSpPr>
             <a:spLocks noGrp="1"/>
@@ -5154,14 +5240,13 @@
           <a:lstStyle/>
           <a:p>
             <a:r>
-              <a:rPr lang="de-DE" dirty="0" err="1" smtClean="0"/>
+              <a:rPr lang="de-DE" dirty="0" err="1"/>
               <a:t>Questions</a:t>
             </a:r>
             <a:r>
-              <a:rPr lang="de-DE" dirty="0" smtClean="0"/>
+              <a:rPr lang="de-DE" dirty="0"/>
               <a:t>?</a:t>
             </a:r>
-            <a:endParaRPr lang="de-DE" dirty="0"/>
           </a:p>
         </p:txBody>
       </p:sp>
@@ -5194,13 +5279,6 @@
   <p:clrMapOvr>
     <a:masterClrMapping/>
   </p:clrMapOvr>
-  <p:timing>
-    <p:tnLst>
-      <p:par>
-        <p:cTn id="1" dur="indefinite" restart="never" nodeType="tmRoot"/>
-      </p:par>
-    </p:tnLst>
-  </p:timing>
 </p:sld>
 </file>
 

</xml_diff>